<commit_message>
Trabalhando no projeto e na aula 10 de aplicativo mobile
</commit_message>
<xml_diff>
--- a/Eugenio Mariz de Oliveira Netto/Programação de Aplicativos Mobile II/Aula 10/Componentes dos aplicativos Android.pptx
+++ b/Eugenio Mariz de Oliveira Netto/Programação de Aplicativos Mobile II/Aula 10/Componentes dos aplicativos Android.pptx
@@ -125,6 +125,11 @@
       </a:defRPr>
     </a:lvl9pPr>
   </p:defaultTextStyle>
+  <p:extLst>
+    <p:ext uri="{EFAFB233-063F-42B5-8137-9DF3F51BA10A}">
+      <p15:sldGuideLst xmlns:p15="http://schemas.microsoft.com/office/powerpoint/2012/main"/>
+    </p:ext>
+  </p:extLst>
 </p:presentation>
 </file>
 
@@ -354,7 +359,7 @@
           <a:p>
             <a:fld id="{BA62042D-1543-4715-A638-AE8B3EAFA67D}" type="datetimeFigureOut">
               <a:rPr lang="pt-BR" smtClean="0"/>
-              <a:t>14/05/2024</a:t>
+              <a:t>15/05/2024</a:t>
             </a:fld>
             <a:endParaRPr lang="pt-BR"/>
           </a:p>
@@ -562,7 +567,7 @@
           <a:p>
             <a:fld id="{BA62042D-1543-4715-A638-AE8B3EAFA67D}" type="datetimeFigureOut">
               <a:rPr lang="pt-BR" smtClean="0"/>
-              <a:t>14/05/2024</a:t>
+              <a:t>15/05/2024</a:t>
             </a:fld>
             <a:endParaRPr lang="pt-BR"/>
           </a:p>
@@ -818,7 +823,7 @@
           <a:p>
             <a:fld id="{BA62042D-1543-4715-A638-AE8B3EAFA67D}" type="datetimeFigureOut">
               <a:rPr lang="pt-BR" smtClean="0"/>
-              <a:t>14/05/2024</a:t>
+              <a:t>15/05/2024</a:t>
             </a:fld>
             <a:endParaRPr lang="pt-BR"/>
           </a:p>
@@ -992,7 +997,7 @@
           <a:p>
             <a:fld id="{BA62042D-1543-4715-A638-AE8B3EAFA67D}" type="datetimeFigureOut">
               <a:rPr lang="pt-BR" smtClean="0"/>
-              <a:t>14/05/2024</a:t>
+              <a:t>15/05/2024</a:t>
             </a:fld>
             <a:endParaRPr lang="pt-BR"/>
           </a:p>
@@ -1335,7 +1340,7 @@
           <a:p>
             <a:fld id="{BA62042D-1543-4715-A638-AE8B3EAFA67D}" type="datetimeFigureOut">
               <a:rPr lang="pt-BR" smtClean="0"/>
-              <a:t>14/05/2024</a:t>
+              <a:t>15/05/2024</a:t>
             </a:fld>
             <a:endParaRPr lang="pt-BR"/>
           </a:p>
@@ -1610,7 +1615,7 @@
           <a:p>
             <a:fld id="{BA62042D-1543-4715-A638-AE8B3EAFA67D}" type="datetimeFigureOut">
               <a:rPr lang="pt-BR" smtClean="0"/>
-              <a:t>14/05/2024</a:t>
+              <a:t>15/05/2024</a:t>
             </a:fld>
             <a:endParaRPr lang="pt-BR"/>
           </a:p>
@@ -1989,7 +1994,7 @@
           <a:p>
             <a:fld id="{BA62042D-1543-4715-A638-AE8B3EAFA67D}" type="datetimeFigureOut">
               <a:rPr lang="pt-BR" smtClean="0"/>
-              <a:t>14/05/2024</a:t>
+              <a:t>15/05/2024</a:t>
             </a:fld>
             <a:endParaRPr lang="pt-BR"/>
           </a:p>
@@ -2107,7 +2112,7 @@
           <a:p>
             <a:fld id="{BA62042D-1543-4715-A638-AE8B3EAFA67D}" type="datetimeFigureOut">
               <a:rPr lang="pt-BR" smtClean="0"/>
-              <a:t>14/05/2024</a:t>
+              <a:t>15/05/2024</a:t>
             </a:fld>
             <a:endParaRPr lang="pt-BR"/>
           </a:p>
@@ -2278,7 +2283,7 @@
           <a:p>
             <a:fld id="{BA62042D-1543-4715-A638-AE8B3EAFA67D}" type="datetimeFigureOut">
               <a:rPr lang="pt-BR" smtClean="0"/>
-              <a:t>14/05/2024</a:t>
+              <a:t>15/05/2024</a:t>
             </a:fld>
             <a:endParaRPr lang="pt-BR"/>
           </a:p>
@@ -2632,7 +2637,7 @@
           <a:p>
             <a:fld id="{BA62042D-1543-4715-A638-AE8B3EAFA67D}" type="datetimeFigureOut">
               <a:rPr lang="pt-BR" smtClean="0"/>
-              <a:t>14/05/2024</a:t>
+              <a:t>15/05/2024</a:t>
             </a:fld>
             <a:endParaRPr lang="pt-BR"/>
           </a:p>
@@ -3014,7 +3019,7 @@
           <a:p>
             <a:fld id="{BA62042D-1543-4715-A638-AE8B3EAFA67D}" type="datetimeFigureOut">
               <a:rPr lang="pt-BR" smtClean="0"/>
-              <a:t>14/05/2024</a:t>
+              <a:t>15/05/2024</a:t>
             </a:fld>
             <a:endParaRPr lang="pt-BR"/>
           </a:p>
@@ -3301,7 +3306,7 @@
           <a:p>
             <a:fld id="{BA62042D-1543-4715-A638-AE8B3EAFA67D}" type="datetimeFigureOut">
               <a:rPr lang="pt-BR" smtClean="0"/>
-              <a:t>14/05/2024</a:t>
+              <a:t>15/05/2024</a:t>
             </a:fld>
             <a:endParaRPr lang="pt-BR"/>
           </a:p>
@@ -6932,8 +6937,12 @@
               <a:t> e Wald (2016) definiu que os </a:t>
             </a:r>
             <a:r>
+              <a:rPr lang="pt-BR" i="1" dirty="0" err="1"/>
+              <a:t>content</a:t>
+            </a:r>
+            <a:r>
               <a:rPr lang="pt-BR" i="1" dirty="0"/>
-              <a:t>contente providers </a:t>
+              <a:t> providers </a:t>
             </a:r>
             <a:r>
               <a:rPr lang="pt-BR" dirty="0"/>
@@ -6954,8 +6963,12 @@
               <a:t>Os aplicativos podem usar o </a:t>
             </a:r>
             <a:r>
+              <a:rPr lang="pt-BR" i="1" dirty="0" err="1"/>
+              <a:t>content</a:t>
+            </a:r>
+            <a:r>
               <a:rPr lang="pt-BR" i="1" dirty="0"/>
-              <a:t>contente providers</a:t>
+              <a:t> providers</a:t>
             </a:r>
             <a:r>
               <a:rPr lang="pt-BR" dirty="0"/>
@@ -7172,8 +7185,12 @@
               <a:t>São pelos </a:t>
             </a:r>
             <a:r>
+              <a:rPr lang="pt-BR" i="1" dirty="0" err="1"/>
+              <a:t>content</a:t>
+            </a:r>
+            <a:r>
               <a:rPr lang="pt-BR" i="1" dirty="0"/>
-              <a:t>contente providers </a:t>
+              <a:t> providers </a:t>
             </a:r>
             <a:r>
               <a:rPr lang="pt-BR" dirty="0"/>
@@ -7186,8 +7203,12 @@
               <a:t>Podemos utilizar um aplicativo que utilizará </a:t>
             </a:r>
             <a:r>
+              <a:rPr lang="pt-BR" i="1" dirty="0" err="1"/>
+              <a:t>content</a:t>
+            </a:r>
+            <a:r>
               <a:rPr lang="pt-BR" i="1" dirty="0"/>
-              <a:t>contente providers </a:t>
+              <a:t> providers </a:t>
             </a:r>
             <a:r>
               <a:rPr lang="pt-BR" dirty="0"/>
@@ -9153,8 +9174,12 @@
               <a:t>Como funciona um </a:t>
             </a:r>
             <a:r>
+              <a:rPr lang="pt-BR" i="1" dirty="0" err="1"/>
+              <a:t>intent</a:t>
+            </a:r>
+            <a:r>
               <a:rPr lang="pt-BR" i="1" dirty="0"/>
-              <a:t>intente </a:t>
+              <a:t> </a:t>
             </a:r>
             <a:r>
               <a:rPr lang="pt-BR" dirty="0"/>

</xml_diff>